<commit_message>
Subindo apresentação e atualizandoa tela.
</commit_message>
<xml_diff>
--- a/ArquiteturaModeloProjetoSpringBoot.pptx
+++ b/ArquiteturaModeloProjetoSpringBoot.pptx
@@ -5,10 +5,10 @@
     <p:sldMasterId id="2147483648" r:id="rId1"/>
   </p:sldMasterIdLst>
   <p:notesMasterIdLst>
-    <p:notesMasterId r:id="rId14"/>
+    <p:notesMasterId r:id="rId16"/>
   </p:notesMasterIdLst>
   <p:handoutMasterIdLst>
-    <p:handoutMasterId r:id="rId15"/>
+    <p:handoutMasterId r:id="rId17"/>
   </p:handoutMasterIdLst>
   <p:sldIdLst>
     <p:sldId id="256" r:id="rId3"/>
@@ -20,8 +20,10 @@
     <p:sldId id="279" r:id="rId9"/>
     <p:sldId id="262" r:id="rId10"/>
     <p:sldId id="281" r:id="rId11"/>
-    <p:sldId id="280" r:id="rId12"/>
-    <p:sldId id="263" r:id="rId13"/>
+    <p:sldId id="284" r:id="rId12"/>
+    <p:sldId id="285" r:id="rId13"/>
+    <p:sldId id="280" r:id="rId14"/>
+    <p:sldId id="263" r:id="rId15"/>
   </p:sldIdLst>
   <p:sldSz cx="12192000" cy="6858000"/>
   <p:notesSz cx="7103745" cy="10234295"/>
@@ -4051,64 +4053,106 @@
           <a:bodyPr/>
           <a:p>
             <a:r>
-              <a:rPr lang="pt-BR" altLang="en-US"/>
-              <a:t>Explicação - Resumida</a:t>
+              <a:rPr lang="pt-BR" altLang="en-US">
+                <a:sym typeface="+mn-ea"/>
+              </a:rPr>
+              <a:t>WEB / REST - Modelo Exemplo</a:t>
             </a:r>
             <a:endParaRPr lang="pt-BR" altLang="en-US"/>
           </a:p>
         </p:txBody>
       </p:sp>
-      <p:sp>
-        <p:nvSpPr>
-          <p:cNvPr id="3" name="Espaço Reservado para Conteúdo 2"/>
-          <p:cNvSpPr>
-            <a:spLocks noGrp="1"/>
-          </p:cNvSpPr>
+      <p:graphicFrame>
+        <p:nvGraphicFramePr>
+          <p:cNvPr id="4" name="Espaço Reservado para Conteúdo 3"/>
+          <p:cNvGraphicFramePr>
+            <a:graphicFrameLocks noChangeAspect="1"/>
+          </p:cNvGraphicFramePr>
           <p:nvPr>
             <p:ph idx="1"/>
           </p:nvPr>
+        </p:nvGraphicFramePr>
+        <p:xfrm>
+          <a:off x="510540" y="1991995"/>
+          <a:ext cx="11071860" cy="4725670"/>
+        </p:xfrm>
+        <a:graphic>
+          <a:graphicData uri="http://schemas.openxmlformats.org/presentationml/2006/ole">
+            <mc:AlternateContent xmlns:mc="http://schemas.openxmlformats.org/markup-compatibility/2006">
+              <mc:Choice xmlns:v="urn:schemas-microsoft-com:vml" Requires="v">
+                <p:oleObj spid="_x0000_s5" name="" r:id="rId1" imgW="7258050" imgH="3552825" progId="Paint.Picture">
+                  <p:embed/>
+                </p:oleObj>
+              </mc:Choice>
+              <mc:Fallback>
+                <p:oleObj name="" r:id="rId1" imgW="7258050" imgH="3552825" progId="Paint.Picture">
+                  <p:embed/>
+                  <p:pic>
+                    <p:nvPicPr>
+                      <p:cNvPr id="0" name="Imagem 4"/>
+                      <p:cNvPicPr/>
+                      <p:nvPr/>
+                    </p:nvPicPr>
+                    <p:blipFill>
+                      <a:blip r:embed="rId2"/>
+                      <a:stretch>
+                        <a:fillRect/>
+                      </a:stretch>
+                    </p:blipFill>
+                    <p:spPr>
+                      <a:xfrm>
+                        <a:off x="510540" y="1991995"/>
+                        <a:ext cx="11071860" cy="4725670"/>
+                      </a:xfrm>
+                      <a:prstGeom prst="rect">
+                        <a:avLst/>
+                      </a:prstGeom>
+                    </p:spPr>
+                  </p:pic>
+                </p:oleObj>
+              </mc:Fallback>
+            </mc:AlternateContent>
+          </a:graphicData>
+        </a:graphic>
+      </p:graphicFrame>
+      <p:sp>
+        <p:nvSpPr>
+          <p:cNvPr id="6" name="Caixa de Texto 5"/>
+          <p:cNvSpPr txBox="1"/>
+          <p:nvPr/>
         </p:nvSpPr>
         <p:spPr>
           <a:xfrm>
-            <a:off x="387350" y="984250"/>
-            <a:ext cx="10972800" cy="4953000"/>
-          </a:xfrm>
-        </p:spPr>
-        <p:txBody>
-          <a:bodyPr/>
-          <a:p>
-            <a:pPr marL="0" lvl="0" indent="0">
-              <a:buNone/>
-            </a:pPr>
+            <a:off x="810260" y="1198880"/>
+            <a:ext cx="5542280" cy="645160"/>
+          </a:xfrm>
+          <a:prstGeom prst="rect">
+            <a:avLst/>
+          </a:prstGeom>
+          <a:noFill/>
+        </p:spPr>
+        <p:txBody>
+          <a:bodyPr wrap="none" rtlCol="0" anchor="t">
+            <a:spAutoFit/>
+          </a:bodyPr>
+          <a:p>
+            <a:pPr algn="l"/>
             <a:r>
               <a:rPr lang="pt-BR" altLang="en-US"/>
-              <a:t>Nesta configuração executamos um </a:t>
+              <a:t>Dados para teste estão dentro do projeto no Arquivo:</a:t>
+            </a:r>
+            <a:br>
+              <a:rPr lang="pt-BR" altLang="en-US"/>
+            </a:br>
+            <a:r>
+              <a:rPr lang="pt-BR" altLang="en-US"/>
+              <a:t>resource/static/</a:t>
             </a:r>
             <a:r>
               <a:rPr lang="pt-BR" altLang="en-US" b="1"/>
-              <a:t>JAR </a:t>
-            </a:r>
-            <a:r>
-              <a:rPr lang="pt-BR" altLang="en-US"/>
-              <a:t>porque o Container (Tomcat) já é iniciado por dentro da aplicação via o metod Main com a chamada do Spring.</a:t>
-            </a:r>
-            <a:endParaRPr lang="pt-BR" altLang="en-US"/>
-          </a:p>
-          <a:p>
-            <a:pPr marL="0" lvl="0" indent="0">
-              <a:buNone/>
-            </a:pPr>
-            <a:endParaRPr lang="pt-BR" altLang="en-US"/>
-          </a:p>
-          <a:p>
-            <a:pPr marL="0" lvl="0" indent="0">
-              <a:buNone/>
-            </a:pPr>
-            <a:r>
-              <a:rPr lang="pt-BR" altLang="en-US"/>
-              <a:t>Padrão War joga a aplicação em um container pra carregar, com SpringBoot fazemos o inverso, o Container já esta dentro do projeto, logo o bom e velho “Run Java App” vai ser usado.</a:t>
-            </a:r>
-            <a:endParaRPr lang="pt-BR" altLang="en-US"/>
+              <a:t>Postman_Export_Testes.json </a:t>
+            </a:r>
+            <a:endParaRPr lang="pt-BR" altLang="en-US" b="1"/>
           </a:p>
         </p:txBody>
       </p:sp>
@@ -4121,6 +4165,193 @@
 </file>
 
 <file path=ppt/slides/slide11.xml><?xml version="1.0" encoding="utf-8"?>
+<p:sld xmlns:a="http://schemas.openxmlformats.org/drawingml/2006/main" xmlns:r="http://schemas.openxmlformats.org/officeDocument/2006/relationships" xmlns:p="http://schemas.openxmlformats.org/presentationml/2006/main">
+  <p:cSld>
+    <p:spTree>
+      <p:nvGrpSpPr>
+        <p:cNvPr id="1" name=""/>
+        <p:cNvGrpSpPr/>
+        <p:nvPr/>
+      </p:nvGrpSpPr>
+      <p:grpSpPr/>
+      <p:sp>
+        <p:nvSpPr>
+          <p:cNvPr id="2" name="Título 1"/>
+          <p:cNvSpPr>
+            <a:spLocks noGrp="1"/>
+          </p:cNvSpPr>
+          <p:nvPr>
+            <p:ph type="title"/>
+          </p:nvPr>
+        </p:nvSpPr>
+        <p:spPr/>
+        <p:txBody>
+          <a:bodyPr/>
+          <a:p>
+            <a:r>
+              <a:rPr lang="pt-BR" altLang="en-US"/>
+              <a:t>Visualizando no banco H2</a:t>
+            </a:r>
+            <a:endParaRPr lang="pt-BR" altLang="en-US"/>
+          </a:p>
+        </p:txBody>
+      </p:sp>
+      <p:graphicFrame>
+        <p:nvGraphicFramePr>
+          <p:cNvPr id="4" name="Espaço Reservado para Conteúdo 3"/>
+          <p:cNvGraphicFramePr>
+            <a:graphicFrameLocks noChangeAspect="1"/>
+          </p:cNvGraphicFramePr>
+          <p:nvPr>
+            <p:ph idx="1"/>
+          </p:nvPr>
+        </p:nvGraphicFramePr>
+        <p:xfrm>
+          <a:off x="370840" y="1384300"/>
+          <a:ext cx="11212195" cy="5193665"/>
+        </p:xfrm>
+        <a:graphic>
+          <a:graphicData uri="http://schemas.openxmlformats.org/presentationml/2006/ole">
+            <mc:AlternateContent xmlns:mc="http://schemas.openxmlformats.org/markup-compatibility/2006">
+              <mc:Choice xmlns:v="urn:schemas-microsoft-com:vml" Requires="v">
+                <p:oleObj spid="_x0000_s5" name="" r:id="rId1" imgW="9391650" imgH="3771900" progId="Paint.Picture">
+                  <p:embed/>
+                </p:oleObj>
+              </mc:Choice>
+              <mc:Fallback>
+                <p:oleObj name="" r:id="rId1" imgW="9391650" imgH="3771900" progId="Paint.Picture">
+                  <p:embed/>
+                  <p:pic>
+                    <p:nvPicPr>
+                      <p:cNvPr id="0" name="Imagem 4"/>
+                      <p:cNvPicPr/>
+                      <p:nvPr/>
+                    </p:nvPicPr>
+                    <p:blipFill>
+                      <a:blip r:embed="rId2"/>
+                      <a:stretch>
+                        <a:fillRect/>
+                      </a:stretch>
+                    </p:blipFill>
+                    <p:spPr>
+                      <a:xfrm>
+                        <a:off x="370840" y="1384300"/>
+                        <a:ext cx="11212195" cy="5193665"/>
+                      </a:xfrm>
+                      <a:prstGeom prst="rect">
+                        <a:avLst/>
+                      </a:prstGeom>
+                    </p:spPr>
+                  </p:pic>
+                </p:oleObj>
+              </mc:Fallback>
+            </mc:AlternateContent>
+          </a:graphicData>
+        </a:graphic>
+      </p:graphicFrame>
+    </p:spTree>
+  </p:cSld>
+  <p:clrMapOvr>
+    <a:masterClrMapping/>
+  </p:clrMapOvr>
+</p:sld>
+</file>
+
+<file path=ppt/slides/slide12.xml><?xml version="1.0" encoding="utf-8"?>
+<p:sld xmlns:a="http://schemas.openxmlformats.org/drawingml/2006/main" xmlns:r="http://schemas.openxmlformats.org/officeDocument/2006/relationships" xmlns:p="http://schemas.openxmlformats.org/presentationml/2006/main">
+  <p:cSld>
+    <p:spTree>
+      <p:nvGrpSpPr>
+        <p:cNvPr id="1" name=""/>
+        <p:cNvGrpSpPr/>
+        <p:nvPr/>
+      </p:nvGrpSpPr>
+      <p:grpSpPr/>
+      <p:sp>
+        <p:nvSpPr>
+          <p:cNvPr id="2" name="Título 1"/>
+          <p:cNvSpPr>
+            <a:spLocks noGrp="1"/>
+          </p:cNvSpPr>
+          <p:nvPr>
+            <p:ph type="title"/>
+          </p:nvPr>
+        </p:nvSpPr>
+        <p:spPr/>
+        <p:txBody>
+          <a:bodyPr/>
+          <a:p>
+            <a:r>
+              <a:rPr lang="pt-BR" altLang="en-US"/>
+              <a:t>Explicação - Resumida</a:t>
+            </a:r>
+            <a:endParaRPr lang="pt-BR" altLang="en-US"/>
+          </a:p>
+        </p:txBody>
+      </p:sp>
+      <p:sp>
+        <p:nvSpPr>
+          <p:cNvPr id="3" name="Espaço Reservado para Conteúdo 2"/>
+          <p:cNvSpPr>
+            <a:spLocks noGrp="1"/>
+          </p:cNvSpPr>
+          <p:nvPr>
+            <p:ph idx="1"/>
+          </p:nvPr>
+        </p:nvSpPr>
+        <p:spPr>
+          <a:xfrm>
+            <a:off x="387350" y="984250"/>
+            <a:ext cx="10972800" cy="4953000"/>
+          </a:xfrm>
+        </p:spPr>
+        <p:txBody>
+          <a:bodyPr/>
+          <a:p>
+            <a:pPr marL="0" lvl="0" indent="0">
+              <a:buNone/>
+            </a:pPr>
+            <a:r>
+              <a:rPr lang="pt-BR" altLang="en-US"/>
+              <a:t>Nesta configuração executamos um </a:t>
+            </a:r>
+            <a:r>
+              <a:rPr lang="pt-BR" altLang="en-US" b="1"/>
+              <a:t>JAR </a:t>
+            </a:r>
+            <a:r>
+              <a:rPr lang="pt-BR" altLang="en-US"/>
+              <a:t>porque o Container (Tomcat) já é iniciado por dentro da aplicação via o metod Main com a chamada do Spring.</a:t>
+            </a:r>
+            <a:endParaRPr lang="pt-BR" altLang="en-US"/>
+          </a:p>
+          <a:p>
+            <a:pPr marL="0" lvl="0" indent="0">
+              <a:buNone/>
+            </a:pPr>
+            <a:endParaRPr lang="pt-BR" altLang="en-US"/>
+          </a:p>
+          <a:p>
+            <a:pPr marL="0" lvl="0" indent="0">
+              <a:buNone/>
+            </a:pPr>
+            <a:r>
+              <a:rPr lang="pt-BR" altLang="en-US"/>
+              <a:t>Padrão War joga a aplicação em um container pra carregar, com SpringBoot fazemos o inverso, o Container já esta dentro do projeto, logo o bom e velho “Run Java App” vai ser usado.</a:t>
+            </a:r>
+            <a:endParaRPr lang="pt-BR" altLang="en-US"/>
+          </a:p>
+        </p:txBody>
+      </p:sp>
+    </p:spTree>
+  </p:cSld>
+  <p:clrMapOvr>
+    <a:masterClrMapping/>
+  </p:clrMapOvr>
+</p:sld>
+</file>
+
+<file path=ppt/slides/slide13.xml><?xml version="1.0" encoding="utf-8"?>
 <p:sld xmlns:a="http://schemas.openxmlformats.org/drawingml/2006/main" xmlns:r="http://schemas.openxmlformats.org/officeDocument/2006/relationships" xmlns:p="http://schemas.openxmlformats.org/presentationml/2006/main">
   <p:cSld>
     <p:spTree>
@@ -10510,7 +10741,7 @@
           <a:p>
             <a:r>
               <a:rPr lang="pt-BR" altLang="en-US"/>
-              <a:t>Modelo Exemplo</a:t>
+              <a:t>WEB - Modelo Exemplo</a:t>
             </a:r>
             <a:endParaRPr lang="pt-BR" altLang="en-US"/>
           </a:p>
@@ -10628,6 +10859,12 @@
         <p:txBody>
           <a:bodyPr/>
           <a:p>
+            <a:r>
+              <a:rPr lang="pt-BR" altLang="en-US">
+                <a:sym typeface="+mn-ea"/>
+              </a:rPr>
+              <a:t>WEB - Modelo Exemplo</a:t>
+            </a:r>
             <a:endParaRPr lang="pt-BR" altLang="en-US"/>
           </a:p>
         </p:txBody>

</xml_diff>